<commit_message>
update  schematic in PPT
</commit_message>
<xml_diff>
--- a/schematic.pptx
+++ b/schematic.pptx
@@ -7,9 +7,10 @@
   <p:sldIdLst>
     <p:sldId id="256" r:id="rId2"/>
     <p:sldId id="257" r:id="rId3"/>
-    <p:sldId id="258" r:id="rId4"/>
-    <p:sldId id="259" r:id="rId5"/>
-    <p:sldId id="260" r:id="rId6"/>
+    <p:sldId id="261" r:id="rId4"/>
+    <p:sldId id="258" r:id="rId5"/>
+    <p:sldId id="259" r:id="rId6"/>
+    <p:sldId id="260" r:id="rId7"/>
   </p:sldIdLst>
   <p:sldSz cx="12192000" cy="6858000"/>
   <p:notesSz cx="6858000" cy="9144000"/>
@@ -263,7 +264,7 @@
           <a:p>
             <a:fld id="{85503E4C-0638-4F56-B56F-7E2DC4CEAF18}" type="datetimeFigureOut">
               <a:rPr lang="en-US" smtClean="0"/>
-              <a:t>8/21/2023</a:t>
+              <a:t>10/30/2023</a:t>
             </a:fld>
             <a:endParaRPr lang="en-US"/>
           </a:p>
@@ -461,7 +462,7 @@
           <a:p>
             <a:fld id="{85503E4C-0638-4F56-B56F-7E2DC4CEAF18}" type="datetimeFigureOut">
               <a:rPr lang="en-US" smtClean="0"/>
-              <a:t>8/21/2023</a:t>
+              <a:t>10/30/2023</a:t>
             </a:fld>
             <a:endParaRPr lang="en-US"/>
           </a:p>
@@ -669,7 +670,7 @@
           <a:p>
             <a:fld id="{85503E4C-0638-4F56-B56F-7E2DC4CEAF18}" type="datetimeFigureOut">
               <a:rPr lang="en-US" smtClean="0"/>
-              <a:t>8/21/2023</a:t>
+              <a:t>10/30/2023</a:t>
             </a:fld>
             <a:endParaRPr lang="en-US"/>
           </a:p>
@@ -867,7 +868,7 @@
           <a:p>
             <a:fld id="{85503E4C-0638-4F56-B56F-7E2DC4CEAF18}" type="datetimeFigureOut">
               <a:rPr lang="en-US" smtClean="0"/>
-              <a:t>8/21/2023</a:t>
+              <a:t>10/30/2023</a:t>
             </a:fld>
             <a:endParaRPr lang="en-US"/>
           </a:p>
@@ -1142,7 +1143,7 @@
           <a:p>
             <a:fld id="{85503E4C-0638-4F56-B56F-7E2DC4CEAF18}" type="datetimeFigureOut">
               <a:rPr lang="en-US" smtClean="0"/>
-              <a:t>8/21/2023</a:t>
+              <a:t>10/30/2023</a:t>
             </a:fld>
             <a:endParaRPr lang="en-US"/>
           </a:p>
@@ -1407,7 +1408,7 @@
           <a:p>
             <a:fld id="{85503E4C-0638-4F56-B56F-7E2DC4CEAF18}" type="datetimeFigureOut">
               <a:rPr lang="en-US" smtClean="0"/>
-              <a:t>8/21/2023</a:t>
+              <a:t>10/30/2023</a:t>
             </a:fld>
             <a:endParaRPr lang="en-US"/>
           </a:p>
@@ -1819,7 +1820,7 @@
           <a:p>
             <a:fld id="{85503E4C-0638-4F56-B56F-7E2DC4CEAF18}" type="datetimeFigureOut">
               <a:rPr lang="en-US" smtClean="0"/>
-              <a:t>8/21/2023</a:t>
+              <a:t>10/30/2023</a:t>
             </a:fld>
             <a:endParaRPr lang="en-US"/>
           </a:p>
@@ -1960,7 +1961,7 @@
           <a:p>
             <a:fld id="{85503E4C-0638-4F56-B56F-7E2DC4CEAF18}" type="datetimeFigureOut">
               <a:rPr lang="en-US" smtClean="0"/>
-              <a:t>8/21/2023</a:t>
+              <a:t>10/30/2023</a:t>
             </a:fld>
             <a:endParaRPr lang="en-US"/>
           </a:p>
@@ -2073,7 +2074,7 @@
           <a:p>
             <a:fld id="{85503E4C-0638-4F56-B56F-7E2DC4CEAF18}" type="datetimeFigureOut">
               <a:rPr lang="en-US" smtClean="0"/>
-              <a:t>8/21/2023</a:t>
+              <a:t>10/30/2023</a:t>
             </a:fld>
             <a:endParaRPr lang="en-US"/>
           </a:p>
@@ -2384,7 +2385,7 @@
           <a:p>
             <a:fld id="{85503E4C-0638-4F56-B56F-7E2DC4CEAF18}" type="datetimeFigureOut">
               <a:rPr lang="en-US" smtClean="0"/>
-              <a:t>8/21/2023</a:t>
+              <a:t>10/30/2023</a:t>
             </a:fld>
             <a:endParaRPr lang="en-US"/>
           </a:p>
@@ -2672,7 +2673,7 @@
           <a:p>
             <a:fld id="{85503E4C-0638-4F56-B56F-7E2DC4CEAF18}" type="datetimeFigureOut">
               <a:rPr lang="en-US" smtClean="0"/>
-              <a:t>8/21/2023</a:t>
+              <a:t>10/30/2023</a:t>
             </a:fld>
             <a:endParaRPr lang="en-US"/>
           </a:p>
@@ -2913,7 +2914,7 @@
           <a:p>
             <a:fld id="{85503E4C-0638-4F56-B56F-7E2DC4CEAF18}" type="datetimeFigureOut">
               <a:rPr lang="en-US" smtClean="0"/>
-              <a:t>8/21/2023</a:t>
+              <a:t>10/30/2023</a:t>
             </a:fld>
             <a:endParaRPr lang="en-US"/>
           </a:p>
@@ -4296,6 +4297,1485 @@
           <a:chExt cx="0" cy="0"/>
         </a:xfrm>
       </p:grpSpPr>
+      <p:sp>
+        <p:nvSpPr>
+          <p:cNvPr id="2" name="Title 1">
+            <a:extLst>
+              <a:ext uri="{FF2B5EF4-FFF2-40B4-BE49-F238E27FC236}">
+                <a16:creationId xmlns:a16="http://schemas.microsoft.com/office/drawing/2014/main" id="{14AB0AB0-B22A-C810-43AB-20AC40FB12DE}"/>
+              </a:ext>
+            </a:extLst>
+          </p:cNvPr>
+          <p:cNvSpPr>
+            <a:spLocks noGrp="1"/>
+          </p:cNvSpPr>
+          <p:nvPr>
+            <p:ph type="title"/>
+          </p:nvPr>
+        </p:nvSpPr>
+        <p:spPr>
+          <a:xfrm>
+            <a:off x="0" y="-198845"/>
+            <a:ext cx="10515600" cy="1325563"/>
+          </a:xfrm>
+        </p:spPr>
+        <p:txBody>
+          <a:bodyPr/>
+          <a:lstStyle/>
+          <a:p>
+            <a:r>
+              <a:rPr lang="en-US" altLang="zh-CN" b="1" dirty="0"/>
+              <a:t>Architecture</a:t>
+            </a:r>
+            <a:endParaRPr lang="en-US" b="1" dirty="0"/>
+          </a:p>
+        </p:txBody>
+      </p:sp>
+      <p:sp>
+        <p:nvSpPr>
+          <p:cNvPr id="6" name="Flowchart: Multidocument 5">
+            <a:extLst>
+              <a:ext uri="{FF2B5EF4-FFF2-40B4-BE49-F238E27FC236}">
+                <a16:creationId xmlns:a16="http://schemas.microsoft.com/office/drawing/2014/main" id="{F28A9538-BE72-D750-31BF-F0A2EFD9F2D4}"/>
+              </a:ext>
+            </a:extLst>
+          </p:cNvPr>
+          <p:cNvSpPr/>
+          <p:nvPr/>
+        </p:nvSpPr>
+        <p:spPr>
+          <a:xfrm>
+            <a:off x="56112" y="1776135"/>
+            <a:ext cx="1588198" cy="1068421"/>
+          </a:xfrm>
+          <a:prstGeom prst="flowChartMultidocument">
+            <a:avLst/>
+          </a:prstGeom>
+        </p:spPr>
+        <p:style>
+          <a:lnRef idx="2">
+            <a:schemeClr val="accent1">
+              <a:shade val="15000"/>
+            </a:schemeClr>
+          </a:lnRef>
+          <a:fillRef idx="1">
+            <a:schemeClr val="accent1"/>
+          </a:fillRef>
+          <a:effectRef idx="0">
+            <a:schemeClr val="accent1"/>
+          </a:effectRef>
+          <a:fontRef idx="minor">
+            <a:schemeClr val="lt1"/>
+          </a:fontRef>
+        </p:style>
+        <p:txBody>
+          <a:bodyPr rtlCol="0" anchor="ctr"/>
+          <a:lstStyle/>
+          <a:p>
+            <a:pPr algn="ctr"/>
+            <a:r>
+              <a:rPr lang="en-US" sz="1400" dirty="0"/>
+              <a:t>Paper@ </a:t>
+            </a:r>
+            <a:r>
+              <a:rPr lang="en-US" sz="1400" dirty="0" err="1"/>
+              <a:t>arxiv.tex</a:t>
+            </a:r>
+            <a:endParaRPr lang="en-US" sz="1400" dirty="0"/>
+          </a:p>
+        </p:txBody>
+      </p:sp>
+      <p:sp>
+        <p:nvSpPr>
+          <p:cNvPr id="7" name="Flowchart: Document 6">
+            <a:extLst>
+              <a:ext uri="{FF2B5EF4-FFF2-40B4-BE49-F238E27FC236}">
+                <a16:creationId xmlns:a16="http://schemas.microsoft.com/office/drawing/2014/main" id="{BD01A0A2-B812-8385-B077-3750043D465A}"/>
+              </a:ext>
+            </a:extLst>
+          </p:cNvPr>
+          <p:cNvSpPr/>
+          <p:nvPr/>
+        </p:nvSpPr>
+        <p:spPr>
+          <a:xfrm>
+            <a:off x="2379478" y="1759133"/>
+            <a:ext cx="994266" cy="855912"/>
+          </a:xfrm>
+          <a:prstGeom prst="flowChartDocument">
+            <a:avLst/>
+          </a:prstGeom>
+        </p:spPr>
+        <p:style>
+          <a:lnRef idx="2">
+            <a:schemeClr val="accent1">
+              <a:shade val="15000"/>
+            </a:schemeClr>
+          </a:lnRef>
+          <a:fillRef idx="1">
+            <a:schemeClr val="accent1"/>
+          </a:fillRef>
+          <a:effectRef idx="0">
+            <a:schemeClr val="accent1"/>
+          </a:effectRef>
+          <a:fontRef idx="minor">
+            <a:schemeClr val="lt1"/>
+          </a:fontRef>
+        </p:style>
+        <p:txBody>
+          <a:bodyPr rtlCol="0" anchor="ctr"/>
+          <a:lstStyle/>
+          <a:p>
+            <a:pPr algn="ctr"/>
+            <a:r>
+              <a:rPr lang="en-US" sz="1400" dirty="0"/>
+              <a:t>Excerpt</a:t>
+            </a:r>
+          </a:p>
+        </p:txBody>
+      </p:sp>
+      <p:sp>
+        <p:nvSpPr>
+          <p:cNvPr id="13" name="Flowchart: Document 12">
+            <a:extLst>
+              <a:ext uri="{FF2B5EF4-FFF2-40B4-BE49-F238E27FC236}">
+                <a16:creationId xmlns:a16="http://schemas.microsoft.com/office/drawing/2014/main" id="{3B0627F3-8FB7-819D-4ABD-C94AF4CED464}"/>
+              </a:ext>
+            </a:extLst>
+          </p:cNvPr>
+          <p:cNvSpPr/>
+          <p:nvPr/>
+        </p:nvSpPr>
+        <p:spPr>
+          <a:xfrm>
+            <a:off x="4594450" y="1761828"/>
+            <a:ext cx="1234083" cy="796925"/>
+          </a:xfrm>
+          <a:prstGeom prst="flowChartDocument">
+            <a:avLst/>
+          </a:prstGeom>
+        </p:spPr>
+        <p:style>
+          <a:lnRef idx="2">
+            <a:schemeClr val="accent1">
+              <a:shade val="15000"/>
+            </a:schemeClr>
+          </a:lnRef>
+          <a:fillRef idx="1">
+            <a:schemeClr val="accent1"/>
+          </a:fillRef>
+          <a:effectRef idx="0">
+            <a:schemeClr val="accent1"/>
+          </a:effectRef>
+          <a:fontRef idx="minor">
+            <a:schemeClr val="lt1"/>
+          </a:fontRef>
+        </p:style>
+        <p:txBody>
+          <a:bodyPr rtlCol="0" anchor="ctr"/>
+          <a:lstStyle/>
+          <a:p>
+            <a:pPr algn="ctr"/>
+            <a:r>
+              <a:rPr lang="en-US" sz="1400" dirty="0"/>
+              <a:t>Placeholders</a:t>
+            </a:r>
+          </a:p>
+          <a:p>
+            <a:pPr algn="ctr"/>
+            <a:r>
+              <a:rPr lang="en-US" sz="1400" dirty="0"/>
+              <a:t>@arxiv.yaml</a:t>
+            </a:r>
+          </a:p>
+        </p:txBody>
+      </p:sp>
+      <p:sp>
+        <p:nvSpPr>
+          <p:cNvPr id="22" name="Arrow: Right 21">
+            <a:extLst>
+              <a:ext uri="{FF2B5EF4-FFF2-40B4-BE49-F238E27FC236}">
+                <a16:creationId xmlns:a16="http://schemas.microsoft.com/office/drawing/2014/main" id="{2B533DAA-8614-BD62-BAF5-652575AC3979}"/>
+              </a:ext>
+            </a:extLst>
+          </p:cNvPr>
+          <p:cNvSpPr/>
+          <p:nvPr/>
+        </p:nvSpPr>
+        <p:spPr>
+          <a:xfrm>
+            <a:off x="3383759" y="1933020"/>
+            <a:ext cx="1167598" cy="309563"/>
+          </a:xfrm>
+          <a:prstGeom prst="rightArrow">
+            <a:avLst/>
+          </a:prstGeom>
+        </p:spPr>
+        <p:style>
+          <a:lnRef idx="2">
+            <a:schemeClr val="accent2">
+              <a:shade val="15000"/>
+            </a:schemeClr>
+          </a:lnRef>
+          <a:fillRef idx="1">
+            <a:schemeClr val="accent2"/>
+          </a:fillRef>
+          <a:effectRef idx="0">
+            <a:schemeClr val="accent2"/>
+          </a:effectRef>
+          <a:fontRef idx="minor">
+            <a:schemeClr val="lt1"/>
+          </a:fontRef>
+        </p:style>
+        <p:txBody>
+          <a:bodyPr rtlCol="0" anchor="ctr"/>
+          <a:lstStyle/>
+          <a:p>
+            <a:pPr algn="ctr"/>
+            <a:r>
+              <a:rPr lang="en-US" sz="1200" dirty="0">
+                <a:solidFill>
+                  <a:schemeClr val="bg1"/>
+                </a:solidFill>
+              </a:rPr>
+              <a:t>Extractor LLM</a:t>
+            </a:r>
+          </a:p>
+        </p:txBody>
+      </p:sp>
+      <p:sp>
+        <p:nvSpPr>
+          <p:cNvPr id="23" name="Flowchart: Document 22">
+            <a:extLst>
+              <a:ext uri="{FF2B5EF4-FFF2-40B4-BE49-F238E27FC236}">
+                <a16:creationId xmlns:a16="http://schemas.microsoft.com/office/drawing/2014/main" id="{E89C13E2-2347-5856-A2C1-FF68169952E4}"/>
+              </a:ext>
+            </a:extLst>
+          </p:cNvPr>
+          <p:cNvSpPr/>
+          <p:nvPr/>
+        </p:nvSpPr>
+        <p:spPr>
+          <a:xfrm>
+            <a:off x="2436352" y="4636712"/>
+            <a:ext cx="1793569" cy="911163"/>
+          </a:xfrm>
+          <a:prstGeom prst="flowChartDocument">
+            <a:avLst/>
+          </a:prstGeom>
+        </p:spPr>
+        <p:style>
+          <a:lnRef idx="2">
+            <a:schemeClr val="accent1">
+              <a:shade val="15000"/>
+            </a:schemeClr>
+          </a:lnRef>
+          <a:fillRef idx="1">
+            <a:schemeClr val="accent1"/>
+          </a:fillRef>
+          <a:effectRef idx="0">
+            <a:schemeClr val="accent1"/>
+          </a:effectRef>
+          <a:fontRef idx="minor">
+            <a:schemeClr val="lt1"/>
+          </a:fontRef>
+        </p:style>
+        <p:txBody>
+          <a:bodyPr rtlCol="0" anchor="ctr"/>
+          <a:lstStyle/>
+          <a:p>
+            <a:pPr algn="ctr"/>
+            <a:r>
+              <a:rPr lang="en-US" sz="1400" dirty="0"/>
+              <a:t>Prompt template@ prompt_template.md</a:t>
+            </a:r>
+          </a:p>
+        </p:txBody>
+      </p:sp>
+      <p:sp>
+        <p:nvSpPr>
+          <p:cNvPr id="26" name="Arrow: Bent 25">
+            <a:extLst>
+              <a:ext uri="{FF2B5EF4-FFF2-40B4-BE49-F238E27FC236}">
+                <a16:creationId xmlns:a16="http://schemas.microsoft.com/office/drawing/2014/main" id="{3E9B7470-BFA7-EA61-216B-79E7BDEE27C6}"/>
+              </a:ext>
+            </a:extLst>
+          </p:cNvPr>
+          <p:cNvSpPr/>
+          <p:nvPr/>
+        </p:nvSpPr>
+        <p:spPr>
+          <a:xfrm rot="16200000" flipV="1">
+            <a:off x="4533695" y="4028385"/>
+            <a:ext cx="693187" cy="1234082"/>
+          </a:xfrm>
+          <a:prstGeom prst="bentArrow">
+            <a:avLst/>
+          </a:prstGeom>
+        </p:spPr>
+        <p:style>
+          <a:lnRef idx="2">
+            <a:schemeClr val="accent1">
+              <a:shade val="15000"/>
+            </a:schemeClr>
+          </a:lnRef>
+          <a:fillRef idx="1">
+            <a:schemeClr val="accent1"/>
+          </a:fillRef>
+          <a:effectRef idx="0">
+            <a:schemeClr val="accent1"/>
+          </a:effectRef>
+          <a:fontRef idx="minor">
+            <a:schemeClr val="lt1"/>
+          </a:fontRef>
+        </p:style>
+        <p:txBody>
+          <a:bodyPr rtlCol="0" anchor="ctr"/>
+          <a:lstStyle/>
+          <a:p>
+            <a:pPr algn="ctr"/>
+            <a:endParaRPr lang="en-US">
+              <a:solidFill>
+                <a:schemeClr val="tx1"/>
+              </a:solidFill>
+            </a:endParaRPr>
+          </a:p>
+        </p:txBody>
+      </p:sp>
+      <p:sp>
+        <p:nvSpPr>
+          <p:cNvPr id="27" name="Flowchart: Process 26">
+            <a:extLst>
+              <a:ext uri="{FF2B5EF4-FFF2-40B4-BE49-F238E27FC236}">
+                <a16:creationId xmlns:a16="http://schemas.microsoft.com/office/drawing/2014/main" id="{1E61C56B-BFB7-82A4-8328-926D4FCCEE59}"/>
+              </a:ext>
+            </a:extLst>
+          </p:cNvPr>
+          <p:cNvSpPr/>
+          <p:nvPr/>
+        </p:nvSpPr>
+        <p:spPr>
+          <a:xfrm>
+            <a:off x="4495794" y="3563715"/>
+            <a:ext cx="1390650" cy="738049"/>
+          </a:xfrm>
+          <a:prstGeom prst="flowChartProcess">
+            <a:avLst/>
+          </a:prstGeom>
+        </p:spPr>
+        <p:style>
+          <a:lnRef idx="2">
+            <a:schemeClr val="accent1">
+              <a:shade val="15000"/>
+            </a:schemeClr>
+          </a:lnRef>
+          <a:fillRef idx="1">
+            <a:schemeClr val="accent1"/>
+          </a:fillRef>
+          <a:effectRef idx="0">
+            <a:schemeClr val="accent1"/>
+          </a:effectRef>
+          <a:fontRef idx="minor">
+            <a:schemeClr val="lt1"/>
+          </a:fontRef>
+        </p:style>
+        <p:txBody>
+          <a:bodyPr rtlCol="0" anchor="ctr"/>
+          <a:lstStyle/>
+          <a:p>
+            <a:pPr algn="ctr"/>
+            <a:r>
+              <a:rPr lang="en-US" dirty="0"/>
+              <a:t>Prompts</a:t>
+            </a:r>
+          </a:p>
+        </p:txBody>
+      </p:sp>
+      <p:sp>
+        <p:nvSpPr>
+          <p:cNvPr id="28" name="Flowchart: Process 27">
+            <a:extLst>
+              <a:ext uri="{FF2B5EF4-FFF2-40B4-BE49-F238E27FC236}">
+                <a16:creationId xmlns:a16="http://schemas.microsoft.com/office/drawing/2014/main" id="{A2BF143A-B34C-5566-BD30-3F8FCEA49663}"/>
+              </a:ext>
+            </a:extLst>
+          </p:cNvPr>
+          <p:cNvSpPr/>
+          <p:nvPr/>
+        </p:nvSpPr>
+        <p:spPr>
+          <a:xfrm>
+            <a:off x="7054042" y="3563713"/>
+            <a:ext cx="1390650" cy="738049"/>
+          </a:xfrm>
+          <a:prstGeom prst="flowChartProcess">
+            <a:avLst/>
+          </a:prstGeom>
+        </p:spPr>
+        <p:style>
+          <a:lnRef idx="2">
+            <a:schemeClr val="accent1">
+              <a:shade val="15000"/>
+            </a:schemeClr>
+          </a:lnRef>
+          <a:fillRef idx="1">
+            <a:schemeClr val="accent1"/>
+          </a:fillRef>
+          <a:effectRef idx="0">
+            <a:schemeClr val="accent1"/>
+          </a:effectRef>
+          <a:fontRef idx="minor">
+            <a:schemeClr val="lt1"/>
+          </a:fontRef>
+        </p:style>
+        <p:txBody>
+          <a:bodyPr rtlCol="0" anchor="ctr"/>
+          <a:lstStyle/>
+          <a:p>
+            <a:pPr algn="ctr"/>
+            <a:r>
+              <a:rPr lang="en-US" dirty="0"/>
+              <a:t>HF equations</a:t>
+            </a:r>
+          </a:p>
+        </p:txBody>
+      </p:sp>
+      <p:sp>
+        <p:nvSpPr>
+          <p:cNvPr id="30" name="Arrow: Right 29">
+            <a:extLst>
+              <a:ext uri="{FF2B5EF4-FFF2-40B4-BE49-F238E27FC236}">
+                <a16:creationId xmlns:a16="http://schemas.microsoft.com/office/drawing/2014/main" id="{AFA15540-A10B-B498-12C6-9DE599233EE2}"/>
+              </a:ext>
+            </a:extLst>
+          </p:cNvPr>
+          <p:cNvSpPr/>
+          <p:nvPr/>
+        </p:nvSpPr>
+        <p:spPr>
+          <a:xfrm>
+            <a:off x="5886444" y="3777957"/>
+            <a:ext cx="1167598" cy="309563"/>
+          </a:xfrm>
+          <a:prstGeom prst="rightArrow">
+            <a:avLst/>
+          </a:prstGeom>
+        </p:spPr>
+        <p:style>
+          <a:lnRef idx="2">
+            <a:schemeClr val="accent2">
+              <a:shade val="15000"/>
+            </a:schemeClr>
+          </a:lnRef>
+          <a:fillRef idx="1">
+            <a:schemeClr val="accent2"/>
+          </a:fillRef>
+          <a:effectRef idx="0">
+            <a:schemeClr val="accent2"/>
+          </a:effectRef>
+          <a:fontRef idx="minor">
+            <a:schemeClr val="lt1"/>
+          </a:fontRef>
+        </p:style>
+        <p:txBody>
+          <a:bodyPr rtlCol="0" anchor="ctr"/>
+          <a:lstStyle/>
+          <a:p>
+            <a:pPr algn="ctr"/>
+            <a:r>
+              <a:rPr lang="en-US" sz="1200" dirty="0">
+                <a:solidFill>
+                  <a:schemeClr val="bg1"/>
+                </a:solidFill>
+              </a:rPr>
+              <a:t>Execution LLM</a:t>
+            </a:r>
+          </a:p>
+        </p:txBody>
+      </p:sp>
+      <p:sp>
+        <p:nvSpPr>
+          <p:cNvPr id="34" name="Flowchart: Process 33">
+            <a:extLst>
+              <a:ext uri="{FF2B5EF4-FFF2-40B4-BE49-F238E27FC236}">
+                <a16:creationId xmlns:a16="http://schemas.microsoft.com/office/drawing/2014/main" id="{D3EC9757-9FAB-C7DE-D914-B1FD880958BC}"/>
+              </a:ext>
+            </a:extLst>
+          </p:cNvPr>
+          <p:cNvSpPr/>
+          <p:nvPr/>
+        </p:nvSpPr>
+        <p:spPr>
+          <a:xfrm>
+            <a:off x="9711655" y="1720145"/>
+            <a:ext cx="1390650" cy="732192"/>
+          </a:xfrm>
+          <a:prstGeom prst="flowChartProcess">
+            <a:avLst/>
+          </a:prstGeom>
+        </p:spPr>
+        <p:style>
+          <a:lnRef idx="2">
+            <a:schemeClr val="accent1">
+              <a:shade val="15000"/>
+            </a:schemeClr>
+          </a:lnRef>
+          <a:fillRef idx="1">
+            <a:schemeClr val="accent1"/>
+          </a:fillRef>
+          <a:effectRef idx="0">
+            <a:schemeClr val="accent1"/>
+          </a:effectRef>
+          <a:fontRef idx="minor">
+            <a:schemeClr val="lt1"/>
+          </a:fontRef>
+        </p:style>
+        <p:txBody>
+          <a:bodyPr rtlCol="0" anchor="ctr"/>
+          <a:lstStyle/>
+          <a:p>
+            <a:pPr algn="ctr"/>
+            <a:r>
+              <a:rPr lang="en-US" dirty="0"/>
+              <a:t>Scores for reading</a:t>
+            </a:r>
+          </a:p>
+        </p:txBody>
+      </p:sp>
+      <p:grpSp>
+        <p:nvGrpSpPr>
+          <p:cNvPr id="9" name="Group 8">
+            <a:extLst>
+              <a:ext uri="{FF2B5EF4-FFF2-40B4-BE49-F238E27FC236}">
+                <a16:creationId xmlns:a16="http://schemas.microsoft.com/office/drawing/2014/main" id="{B132A66F-77B8-DD0C-7416-5179B7B8F2C4}"/>
+              </a:ext>
+            </a:extLst>
+          </p:cNvPr>
+          <p:cNvGrpSpPr/>
+          <p:nvPr/>
+        </p:nvGrpSpPr>
+        <p:grpSpPr>
+          <a:xfrm>
+            <a:off x="1545130" y="1736229"/>
+            <a:ext cx="994266" cy="814131"/>
+            <a:chOff x="1545130" y="1736229"/>
+            <a:chExt cx="994266" cy="814131"/>
+          </a:xfrm>
+        </p:grpSpPr>
+        <p:sp>
+          <p:nvSpPr>
+            <p:cNvPr id="21" name="Arrow: Right 20">
+              <a:extLst>
+                <a:ext uri="{FF2B5EF4-FFF2-40B4-BE49-F238E27FC236}">
+                  <a16:creationId xmlns:a16="http://schemas.microsoft.com/office/drawing/2014/main" id="{F4CAFB70-9766-6D1F-92F9-29430EA3C44D}"/>
+                </a:ext>
+              </a:extLst>
+            </p:cNvPr>
+            <p:cNvSpPr/>
+            <p:nvPr/>
+          </p:nvSpPr>
+          <p:spPr>
+            <a:xfrm>
+              <a:off x="1665146" y="2005508"/>
+              <a:ext cx="771206" cy="309563"/>
+            </a:xfrm>
+            <a:prstGeom prst="rightArrow">
+              <a:avLst/>
+            </a:prstGeom>
+          </p:spPr>
+          <p:style>
+            <a:lnRef idx="2">
+              <a:schemeClr val="accent1">
+                <a:shade val="15000"/>
+              </a:schemeClr>
+            </a:lnRef>
+            <a:fillRef idx="1">
+              <a:schemeClr val="accent1"/>
+            </a:fillRef>
+            <a:effectRef idx="0">
+              <a:schemeClr val="accent1"/>
+            </a:effectRef>
+            <a:fontRef idx="minor">
+              <a:schemeClr val="lt1"/>
+            </a:fontRef>
+          </p:style>
+          <p:txBody>
+            <a:bodyPr rtlCol="0" anchor="ctr"/>
+            <a:lstStyle/>
+            <a:p>
+              <a:pPr algn="ctr"/>
+              <a:r>
+                <a:rPr lang="en-US" sz="1100" dirty="0"/>
+                <a:t>Human</a:t>
+              </a:r>
+            </a:p>
+          </p:txBody>
+        </p:sp>
+        <p:sp>
+          <p:nvSpPr>
+            <p:cNvPr id="3" name="TextBox 2">
+              <a:extLst>
+                <a:ext uri="{FF2B5EF4-FFF2-40B4-BE49-F238E27FC236}">
+                  <a16:creationId xmlns:a16="http://schemas.microsoft.com/office/drawing/2014/main" id="{B161FDC9-B1C9-6914-A720-765321915C4E}"/>
+                </a:ext>
+              </a:extLst>
+            </p:cNvPr>
+            <p:cNvSpPr txBox="1"/>
+            <p:nvPr/>
+          </p:nvSpPr>
+          <p:spPr>
+            <a:xfrm>
+              <a:off x="1575391" y="1736229"/>
+              <a:ext cx="909638" cy="307777"/>
+            </a:xfrm>
+            <a:prstGeom prst="rect">
+              <a:avLst/>
+            </a:prstGeom>
+            <a:noFill/>
+          </p:spPr>
+          <p:txBody>
+            <a:bodyPr wrap="square" rtlCol="0">
+              <a:spAutoFit/>
+            </a:bodyPr>
+            <a:lstStyle/>
+            <a:p>
+              <a:endParaRPr lang="en-US" sz="1400" dirty="0"/>
+            </a:p>
+          </p:txBody>
+        </p:sp>
+        <p:sp>
+          <p:nvSpPr>
+            <p:cNvPr id="4" name="TextBox 3">
+              <a:extLst>
+                <a:ext uri="{FF2B5EF4-FFF2-40B4-BE49-F238E27FC236}">
+                  <a16:creationId xmlns:a16="http://schemas.microsoft.com/office/drawing/2014/main" id="{3E7DAE99-6893-E490-D6FF-08ED92F91B4D}"/>
+                </a:ext>
+              </a:extLst>
+            </p:cNvPr>
+            <p:cNvSpPr txBox="1"/>
+            <p:nvPr/>
+          </p:nvSpPr>
+          <p:spPr>
+            <a:xfrm>
+              <a:off x="1545130" y="2242583"/>
+              <a:ext cx="994266" cy="307777"/>
+            </a:xfrm>
+            <a:prstGeom prst="rect">
+              <a:avLst/>
+            </a:prstGeom>
+            <a:noFill/>
+          </p:spPr>
+          <p:txBody>
+            <a:bodyPr wrap="square" rtlCol="0">
+              <a:spAutoFit/>
+            </a:bodyPr>
+            <a:lstStyle/>
+            <a:p>
+              <a:r>
+                <a:rPr lang="en-US" sz="1400" dirty="0"/>
+                <a:t>Relevance</a:t>
+              </a:r>
+            </a:p>
+          </p:txBody>
+        </p:sp>
+      </p:grpSp>
+      <p:sp>
+        <p:nvSpPr>
+          <p:cNvPr id="5" name="Arrow: Down 4">
+            <a:extLst>
+              <a:ext uri="{FF2B5EF4-FFF2-40B4-BE49-F238E27FC236}">
+                <a16:creationId xmlns:a16="http://schemas.microsoft.com/office/drawing/2014/main" id="{A9036D27-117F-DF8B-854A-43F458DA0A69}"/>
+              </a:ext>
+            </a:extLst>
+          </p:cNvPr>
+          <p:cNvSpPr/>
+          <p:nvPr/>
+        </p:nvSpPr>
+        <p:spPr>
+          <a:xfrm>
+            <a:off x="5101760" y="2540864"/>
+            <a:ext cx="351161" cy="1040740"/>
+          </a:xfrm>
+          <a:prstGeom prst="downArrow">
+            <a:avLst/>
+          </a:prstGeom>
+        </p:spPr>
+        <p:style>
+          <a:lnRef idx="2">
+            <a:schemeClr val="accent1">
+              <a:shade val="15000"/>
+            </a:schemeClr>
+          </a:lnRef>
+          <a:fillRef idx="1">
+            <a:schemeClr val="accent1"/>
+          </a:fillRef>
+          <a:effectRef idx="0">
+            <a:schemeClr val="accent1"/>
+          </a:effectRef>
+          <a:fontRef idx="minor">
+            <a:schemeClr val="lt1"/>
+          </a:fontRef>
+        </p:style>
+        <p:txBody>
+          <a:bodyPr rtlCol="0" anchor="ctr"/>
+          <a:lstStyle/>
+          <a:p>
+            <a:pPr algn="ctr"/>
+            <a:endParaRPr lang="en-US"/>
+          </a:p>
+        </p:txBody>
+      </p:sp>
+      <p:grpSp>
+        <p:nvGrpSpPr>
+          <p:cNvPr id="10" name="Group 9">
+            <a:extLst>
+              <a:ext uri="{FF2B5EF4-FFF2-40B4-BE49-F238E27FC236}">
+                <a16:creationId xmlns:a16="http://schemas.microsoft.com/office/drawing/2014/main" id="{FCDE65D1-A112-074D-023F-1B1CB7F897AE}"/>
+              </a:ext>
+            </a:extLst>
+          </p:cNvPr>
+          <p:cNvGrpSpPr/>
+          <p:nvPr/>
+        </p:nvGrpSpPr>
+        <p:grpSpPr>
+          <a:xfrm>
+            <a:off x="5954958" y="1950014"/>
+            <a:ext cx="3631002" cy="518052"/>
+            <a:chOff x="1665145" y="2005508"/>
+            <a:chExt cx="2899481" cy="518052"/>
+          </a:xfrm>
+        </p:grpSpPr>
+        <p:sp>
+          <p:nvSpPr>
+            <p:cNvPr id="11" name="Arrow: Right 10">
+              <a:extLst>
+                <a:ext uri="{FF2B5EF4-FFF2-40B4-BE49-F238E27FC236}">
+                  <a16:creationId xmlns:a16="http://schemas.microsoft.com/office/drawing/2014/main" id="{56B08DD3-76CB-1C78-0B41-1C30FF8F4C0F}"/>
+                </a:ext>
+              </a:extLst>
+            </p:cNvPr>
+            <p:cNvSpPr/>
+            <p:nvPr/>
+          </p:nvSpPr>
+          <p:spPr>
+            <a:xfrm>
+              <a:off x="1665145" y="2005508"/>
+              <a:ext cx="2899481" cy="309563"/>
+            </a:xfrm>
+            <a:prstGeom prst="rightArrow">
+              <a:avLst/>
+            </a:prstGeom>
+          </p:spPr>
+          <p:style>
+            <a:lnRef idx="2">
+              <a:schemeClr val="accent1">
+                <a:shade val="15000"/>
+              </a:schemeClr>
+            </a:lnRef>
+            <a:fillRef idx="1">
+              <a:schemeClr val="accent1"/>
+            </a:fillRef>
+            <a:effectRef idx="0">
+              <a:schemeClr val="accent1"/>
+            </a:effectRef>
+            <a:fontRef idx="minor">
+              <a:schemeClr val="lt1"/>
+            </a:fontRef>
+          </p:style>
+          <p:txBody>
+            <a:bodyPr rtlCol="0" anchor="ctr"/>
+            <a:lstStyle/>
+            <a:p>
+              <a:pPr algn="ctr"/>
+              <a:r>
+                <a:rPr lang="en-US" sz="1400" dirty="0"/>
+                <a:t>Human</a:t>
+              </a:r>
+            </a:p>
+          </p:txBody>
+        </p:sp>
+        <p:sp>
+          <p:nvSpPr>
+            <p:cNvPr id="14" name="TextBox 13">
+              <a:extLst>
+                <a:ext uri="{FF2B5EF4-FFF2-40B4-BE49-F238E27FC236}">
+                  <a16:creationId xmlns:a16="http://schemas.microsoft.com/office/drawing/2014/main" id="{41A8067A-695A-82F9-5356-3896E09AB7EC}"/>
+                </a:ext>
+              </a:extLst>
+            </p:cNvPr>
+            <p:cNvSpPr txBox="1"/>
+            <p:nvPr/>
+          </p:nvSpPr>
+          <p:spPr>
+            <a:xfrm>
+              <a:off x="2804115" y="2215783"/>
+              <a:ext cx="587856" cy="307777"/>
+            </a:xfrm>
+            <a:prstGeom prst="rect">
+              <a:avLst/>
+            </a:prstGeom>
+            <a:noFill/>
+          </p:spPr>
+          <p:txBody>
+            <a:bodyPr wrap="square" rtlCol="0">
+              <a:spAutoFit/>
+            </a:bodyPr>
+            <a:lstStyle/>
+            <a:p>
+              <a:r>
+                <a:rPr lang="en-US" sz="1400" dirty="0"/>
+                <a:t>Rubrics</a:t>
+              </a:r>
+            </a:p>
+          </p:txBody>
+        </p:sp>
+      </p:grpSp>
+      <p:sp>
+        <p:nvSpPr>
+          <p:cNvPr id="15" name="Flowchart: Process 14">
+            <a:extLst>
+              <a:ext uri="{FF2B5EF4-FFF2-40B4-BE49-F238E27FC236}">
+                <a16:creationId xmlns:a16="http://schemas.microsoft.com/office/drawing/2014/main" id="{25929C7C-9C3A-8C5A-4199-511BD5F72814}"/>
+              </a:ext>
+            </a:extLst>
+          </p:cNvPr>
+          <p:cNvSpPr/>
+          <p:nvPr/>
+        </p:nvSpPr>
+        <p:spPr>
+          <a:xfrm>
+            <a:off x="9711655" y="3523073"/>
+            <a:ext cx="1390650" cy="732192"/>
+          </a:xfrm>
+          <a:prstGeom prst="flowChartProcess">
+            <a:avLst/>
+          </a:prstGeom>
+        </p:spPr>
+        <p:style>
+          <a:lnRef idx="2">
+            <a:schemeClr val="accent1">
+              <a:shade val="15000"/>
+            </a:schemeClr>
+          </a:lnRef>
+          <a:fillRef idx="1">
+            <a:schemeClr val="accent1"/>
+          </a:fillRef>
+          <a:effectRef idx="0">
+            <a:schemeClr val="accent1"/>
+          </a:effectRef>
+          <a:fontRef idx="minor">
+            <a:schemeClr val="lt1"/>
+          </a:fontRef>
+        </p:style>
+        <p:txBody>
+          <a:bodyPr rtlCol="0" anchor="ctr"/>
+          <a:lstStyle/>
+          <a:p>
+            <a:pPr algn="ctr"/>
+            <a:r>
+              <a:rPr lang="en-US" dirty="0"/>
+              <a:t>Scores for execution</a:t>
+            </a:r>
+          </a:p>
+        </p:txBody>
+      </p:sp>
+      <p:grpSp>
+        <p:nvGrpSpPr>
+          <p:cNvPr id="16" name="Group 15">
+            <a:extLst>
+              <a:ext uri="{FF2B5EF4-FFF2-40B4-BE49-F238E27FC236}">
+                <a16:creationId xmlns:a16="http://schemas.microsoft.com/office/drawing/2014/main" id="{C8AA34DA-7907-0EE2-4C97-9B49D5C7C4BF}"/>
+              </a:ext>
+            </a:extLst>
+          </p:cNvPr>
+          <p:cNvGrpSpPr/>
+          <p:nvPr/>
+        </p:nvGrpSpPr>
+        <p:grpSpPr>
+          <a:xfrm>
+            <a:off x="8486249" y="3719591"/>
+            <a:ext cx="1183849" cy="535674"/>
+            <a:chOff x="1665145" y="2005508"/>
+            <a:chExt cx="2899481" cy="535674"/>
+          </a:xfrm>
+        </p:grpSpPr>
+        <p:sp>
+          <p:nvSpPr>
+            <p:cNvPr id="17" name="Arrow: Right 16">
+              <a:extLst>
+                <a:ext uri="{FF2B5EF4-FFF2-40B4-BE49-F238E27FC236}">
+                  <a16:creationId xmlns:a16="http://schemas.microsoft.com/office/drawing/2014/main" id="{6D3321F7-FAA5-1B52-C725-EA2BAF5EBCC7}"/>
+                </a:ext>
+              </a:extLst>
+            </p:cNvPr>
+            <p:cNvSpPr/>
+            <p:nvPr/>
+          </p:nvSpPr>
+          <p:spPr>
+            <a:xfrm>
+              <a:off x="1665145" y="2005508"/>
+              <a:ext cx="2899481" cy="309563"/>
+            </a:xfrm>
+            <a:prstGeom prst="rightArrow">
+              <a:avLst/>
+            </a:prstGeom>
+          </p:spPr>
+          <p:style>
+            <a:lnRef idx="2">
+              <a:schemeClr val="accent1">
+                <a:shade val="15000"/>
+              </a:schemeClr>
+            </a:lnRef>
+            <a:fillRef idx="1">
+              <a:schemeClr val="accent1"/>
+            </a:fillRef>
+            <a:effectRef idx="0">
+              <a:schemeClr val="accent1"/>
+            </a:effectRef>
+            <a:fontRef idx="minor">
+              <a:schemeClr val="lt1"/>
+            </a:fontRef>
+          </p:style>
+          <p:txBody>
+            <a:bodyPr rtlCol="0" anchor="ctr"/>
+            <a:lstStyle/>
+            <a:p>
+              <a:pPr algn="ctr"/>
+              <a:r>
+                <a:rPr lang="en-US" sz="1400" dirty="0"/>
+                <a:t>Human</a:t>
+              </a:r>
+            </a:p>
+          </p:txBody>
+        </p:sp>
+        <p:sp>
+          <p:nvSpPr>
+            <p:cNvPr id="18" name="TextBox 17">
+              <a:extLst>
+                <a:ext uri="{FF2B5EF4-FFF2-40B4-BE49-F238E27FC236}">
+                  <a16:creationId xmlns:a16="http://schemas.microsoft.com/office/drawing/2014/main" id="{48F3EE44-5667-A772-D4EB-1162B77E13E0}"/>
+                </a:ext>
+              </a:extLst>
+            </p:cNvPr>
+            <p:cNvSpPr txBox="1"/>
+            <p:nvPr/>
+          </p:nvSpPr>
+          <p:spPr>
+            <a:xfrm>
+              <a:off x="2078851" y="2233405"/>
+              <a:ext cx="1813538" cy="307777"/>
+            </a:xfrm>
+            <a:prstGeom prst="rect">
+              <a:avLst/>
+            </a:prstGeom>
+            <a:noFill/>
+          </p:spPr>
+          <p:txBody>
+            <a:bodyPr wrap="square" rtlCol="0">
+              <a:spAutoFit/>
+            </a:bodyPr>
+            <a:lstStyle/>
+            <a:p>
+              <a:r>
+                <a:rPr lang="en-US" sz="1400" dirty="0"/>
+                <a:t>Rubrics</a:t>
+              </a:r>
+            </a:p>
+          </p:txBody>
+        </p:sp>
+      </p:grpSp>
+      <p:grpSp>
+        <p:nvGrpSpPr>
+          <p:cNvPr id="24" name="Group 23">
+            <a:extLst>
+              <a:ext uri="{FF2B5EF4-FFF2-40B4-BE49-F238E27FC236}">
+                <a16:creationId xmlns:a16="http://schemas.microsoft.com/office/drawing/2014/main" id="{F3414E22-CE57-616E-0EA1-32830DCEC1D9}"/>
+              </a:ext>
+            </a:extLst>
+          </p:cNvPr>
+          <p:cNvGrpSpPr/>
+          <p:nvPr/>
+        </p:nvGrpSpPr>
+        <p:grpSpPr>
+          <a:xfrm>
+            <a:off x="0" y="711323"/>
+            <a:ext cx="5886444" cy="2575186"/>
+            <a:chOff x="0" y="711323"/>
+            <a:chExt cx="5886444" cy="2575186"/>
+          </a:xfrm>
+        </p:grpSpPr>
+        <p:sp>
+          <p:nvSpPr>
+            <p:cNvPr id="19" name="Rectangle: Rounded Corners 18">
+              <a:extLst>
+                <a:ext uri="{FF2B5EF4-FFF2-40B4-BE49-F238E27FC236}">
+                  <a16:creationId xmlns:a16="http://schemas.microsoft.com/office/drawing/2014/main" id="{1E3089B0-7B9C-0A82-34B4-93F6071AAC86}"/>
+                </a:ext>
+              </a:extLst>
+            </p:cNvPr>
+            <p:cNvSpPr/>
+            <p:nvPr/>
+          </p:nvSpPr>
+          <p:spPr>
+            <a:xfrm>
+              <a:off x="0" y="1041761"/>
+              <a:ext cx="5886444" cy="2244748"/>
+            </a:xfrm>
+            <a:prstGeom prst="roundRect">
+              <a:avLst/>
+            </a:prstGeom>
+            <a:noFill/>
+            <a:ln w="38100">
+              <a:solidFill>
+                <a:srgbClr val="FF0000"/>
+              </a:solidFill>
+              <a:prstDash val="sysDash"/>
+            </a:ln>
+          </p:spPr>
+          <p:style>
+            <a:lnRef idx="2">
+              <a:schemeClr val="accent1">
+                <a:shade val="15000"/>
+              </a:schemeClr>
+            </a:lnRef>
+            <a:fillRef idx="1">
+              <a:schemeClr val="accent1"/>
+            </a:fillRef>
+            <a:effectRef idx="0">
+              <a:schemeClr val="accent1"/>
+            </a:effectRef>
+            <a:fontRef idx="minor">
+              <a:schemeClr val="lt1"/>
+            </a:fontRef>
+          </p:style>
+          <p:txBody>
+            <a:bodyPr rtlCol="0" anchor="ctr"/>
+            <a:lstStyle/>
+            <a:p>
+              <a:pPr algn="ctr"/>
+              <a:endParaRPr lang="en-US" dirty="0"/>
+            </a:p>
+          </p:txBody>
+        </p:sp>
+        <p:sp>
+          <p:nvSpPr>
+            <p:cNvPr id="20" name="TextBox 19">
+              <a:extLst>
+                <a:ext uri="{FF2B5EF4-FFF2-40B4-BE49-F238E27FC236}">
+                  <a16:creationId xmlns:a16="http://schemas.microsoft.com/office/drawing/2014/main" id="{977371E1-29F3-6176-B3F8-7F86C7DF4590}"/>
+                </a:ext>
+              </a:extLst>
+            </p:cNvPr>
+            <p:cNvSpPr txBox="1"/>
+            <p:nvPr/>
+          </p:nvSpPr>
+          <p:spPr>
+            <a:xfrm>
+              <a:off x="4594450" y="711323"/>
+              <a:ext cx="1034386" cy="369332"/>
+            </a:xfrm>
+            <a:prstGeom prst="rect">
+              <a:avLst/>
+            </a:prstGeom>
+            <a:noFill/>
+            <a:ln>
+              <a:noFill/>
+            </a:ln>
+          </p:spPr>
+          <p:txBody>
+            <a:bodyPr wrap="none" rtlCol="0">
+              <a:spAutoFit/>
+            </a:bodyPr>
+            <a:lstStyle/>
+            <a:p>
+              <a:r>
+                <a:rPr lang="en-US" dirty="0">
+                  <a:solidFill>
+                    <a:srgbClr val="FF0000"/>
+                  </a:solidFill>
+                </a:rPr>
+                <a:t>Extractor</a:t>
+              </a:r>
+            </a:p>
+          </p:txBody>
+        </p:sp>
+      </p:grpSp>
+      <p:grpSp>
+        <p:nvGrpSpPr>
+          <p:cNvPr id="29" name="Group 28">
+            <a:extLst>
+              <a:ext uri="{FF2B5EF4-FFF2-40B4-BE49-F238E27FC236}">
+                <a16:creationId xmlns:a16="http://schemas.microsoft.com/office/drawing/2014/main" id="{95052D14-3726-FD99-EE52-45C0F3A10A13}"/>
+              </a:ext>
+            </a:extLst>
+          </p:cNvPr>
+          <p:cNvGrpSpPr/>
+          <p:nvPr/>
+        </p:nvGrpSpPr>
+        <p:grpSpPr>
+          <a:xfrm>
+            <a:off x="20778" y="3109621"/>
+            <a:ext cx="8549181" cy="2579400"/>
+            <a:chOff x="0" y="707109"/>
+            <a:chExt cx="5886444" cy="2579400"/>
+          </a:xfrm>
+        </p:grpSpPr>
+        <p:sp>
+          <p:nvSpPr>
+            <p:cNvPr id="36" name="Rectangle: Rounded Corners 35">
+              <a:extLst>
+                <a:ext uri="{FF2B5EF4-FFF2-40B4-BE49-F238E27FC236}">
+                  <a16:creationId xmlns:a16="http://schemas.microsoft.com/office/drawing/2014/main" id="{31CFC15C-E09A-71B1-F7DA-68BDC5756676}"/>
+                </a:ext>
+              </a:extLst>
+            </p:cNvPr>
+            <p:cNvSpPr/>
+            <p:nvPr/>
+          </p:nvSpPr>
+          <p:spPr>
+            <a:xfrm>
+              <a:off x="0" y="1041761"/>
+              <a:ext cx="5886444" cy="2244748"/>
+            </a:xfrm>
+            <a:prstGeom prst="roundRect">
+              <a:avLst/>
+            </a:prstGeom>
+            <a:noFill/>
+            <a:ln w="38100">
+              <a:solidFill>
+                <a:srgbClr val="FF0000"/>
+              </a:solidFill>
+              <a:prstDash val="sysDash"/>
+            </a:ln>
+          </p:spPr>
+          <p:style>
+            <a:lnRef idx="2">
+              <a:schemeClr val="accent1">
+                <a:shade val="15000"/>
+              </a:schemeClr>
+            </a:lnRef>
+            <a:fillRef idx="1">
+              <a:schemeClr val="accent1"/>
+            </a:fillRef>
+            <a:effectRef idx="0">
+              <a:schemeClr val="accent1"/>
+            </a:effectRef>
+            <a:fontRef idx="minor">
+              <a:schemeClr val="lt1"/>
+            </a:fontRef>
+          </p:style>
+          <p:txBody>
+            <a:bodyPr rtlCol="0" anchor="ctr"/>
+            <a:lstStyle/>
+            <a:p>
+              <a:pPr algn="ctr"/>
+              <a:endParaRPr lang="en-US" dirty="0"/>
+            </a:p>
+          </p:txBody>
+        </p:sp>
+        <p:sp>
+          <p:nvSpPr>
+            <p:cNvPr id="37" name="TextBox 36">
+              <a:extLst>
+                <a:ext uri="{FF2B5EF4-FFF2-40B4-BE49-F238E27FC236}">
+                  <a16:creationId xmlns:a16="http://schemas.microsoft.com/office/drawing/2014/main" id="{F0BD5E5B-AF39-D34A-45BE-050A9BB0B622}"/>
+                </a:ext>
+              </a:extLst>
+            </p:cNvPr>
+            <p:cNvSpPr txBox="1"/>
+            <p:nvPr/>
+          </p:nvSpPr>
+          <p:spPr>
+            <a:xfrm>
+              <a:off x="5067994" y="707109"/>
+              <a:ext cx="689831" cy="369332"/>
+            </a:xfrm>
+            <a:prstGeom prst="rect">
+              <a:avLst/>
+            </a:prstGeom>
+            <a:noFill/>
+            <a:ln>
+              <a:noFill/>
+            </a:ln>
+          </p:spPr>
+          <p:txBody>
+            <a:bodyPr wrap="none" rtlCol="0">
+              <a:spAutoFit/>
+            </a:bodyPr>
+            <a:lstStyle/>
+            <a:p>
+              <a:r>
+                <a:rPr lang="en-US" dirty="0">
+                  <a:solidFill>
+                    <a:srgbClr val="FF0000"/>
+                  </a:solidFill>
+                </a:rPr>
+                <a:t>Executor</a:t>
+              </a:r>
+            </a:p>
+          </p:txBody>
+        </p:sp>
+      </p:grpSp>
+      <p:sp>
+        <p:nvSpPr>
+          <p:cNvPr id="41" name="TextBox 40">
+            <a:extLst>
+              <a:ext uri="{FF2B5EF4-FFF2-40B4-BE49-F238E27FC236}">
+                <a16:creationId xmlns:a16="http://schemas.microsoft.com/office/drawing/2014/main" id="{05F53B44-D57D-69CE-A3BE-57632AB01020}"/>
+              </a:ext>
+            </a:extLst>
+          </p:cNvPr>
+          <p:cNvSpPr txBox="1"/>
+          <p:nvPr/>
+        </p:nvSpPr>
+        <p:spPr>
+          <a:xfrm>
+            <a:off x="10208387" y="701267"/>
+            <a:ext cx="872034" cy="369333"/>
+          </a:xfrm>
+          <a:prstGeom prst="rect">
+            <a:avLst/>
+          </a:prstGeom>
+          <a:noFill/>
+          <a:ln>
+            <a:noFill/>
+          </a:ln>
+        </p:spPr>
+        <p:txBody>
+          <a:bodyPr wrap="none" rtlCol="0">
+            <a:spAutoFit/>
+          </a:bodyPr>
+          <a:lstStyle/>
+          <a:p>
+            <a:r>
+              <a:rPr lang="en-US" dirty="0">
+                <a:solidFill>
+                  <a:srgbClr val="92D050"/>
+                </a:solidFill>
+              </a:rPr>
+              <a:t>Scoring</a:t>
+            </a:r>
+          </a:p>
+        </p:txBody>
+      </p:sp>
+      <p:sp>
+        <p:nvSpPr>
+          <p:cNvPr id="44" name="Freeform: Shape 43">
+            <a:extLst>
+              <a:ext uri="{FF2B5EF4-FFF2-40B4-BE49-F238E27FC236}">
+                <a16:creationId xmlns:a16="http://schemas.microsoft.com/office/drawing/2014/main" id="{39A97ACE-7B54-0C84-C1F0-D34CDCB13D55}"/>
+              </a:ext>
+            </a:extLst>
+          </p:cNvPr>
+          <p:cNvSpPr/>
+          <p:nvPr/>
+        </p:nvSpPr>
+        <p:spPr>
+          <a:xfrm>
+            <a:off x="6053109" y="1087335"/>
+            <a:ext cx="5473615" cy="4500665"/>
+          </a:xfrm>
+          <a:custGeom>
+            <a:avLst/>
+            <a:gdLst>
+              <a:gd name="connsiteX0" fmla="*/ 3143213 w 5473615"/>
+              <a:gd name="connsiteY0" fmla="*/ 0 h 4699056"/>
+              <a:gd name="connsiteX1" fmla="*/ 5007524 w 5473615"/>
+              <a:gd name="connsiteY1" fmla="*/ 0 h 4699056"/>
+              <a:gd name="connsiteX2" fmla="*/ 5473615 w 5473615"/>
+              <a:gd name="connsiteY2" fmla="*/ 466091 h 4699056"/>
+              <a:gd name="connsiteX3" fmla="*/ 5473615 w 5473615"/>
+              <a:gd name="connsiteY3" fmla="*/ 4232965 h 4699056"/>
+              <a:gd name="connsiteX4" fmla="*/ 5007524 w 5473615"/>
+              <a:gd name="connsiteY4" fmla="*/ 4699056 h 4699056"/>
+              <a:gd name="connsiteX5" fmla="*/ 3143213 w 5473615"/>
+              <a:gd name="connsiteY5" fmla="*/ 4699056 h 4699056"/>
+              <a:gd name="connsiteX6" fmla="*/ 2677122 w 5473615"/>
+              <a:gd name="connsiteY6" fmla="*/ 4232965 h 4699056"/>
+              <a:gd name="connsiteX7" fmla="*/ 2677122 w 5473615"/>
+              <a:gd name="connsiteY7" fmla="*/ 2215326 h 4699056"/>
+              <a:gd name="connsiteX8" fmla="*/ 368946 w 5473615"/>
+              <a:gd name="connsiteY8" fmla="*/ 2215326 h 4699056"/>
+              <a:gd name="connsiteX9" fmla="*/ 0 w 5473615"/>
+              <a:gd name="connsiteY9" fmla="*/ 1846380 h 4699056"/>
+              <a:gd name="connsiteX10" fmla="*/ 0 w 5473615"/>
+              <a:gd name="connsiteY10" fmla="*/ 370640 h 4699056"/>
+              <a:gd name="connsiteX11" fmla="*/ 368946 w 5473615"/>
+              <a:gd name="connsiteY11" fmla="*/ 1694 h 4699056"/>
+              <a:gd name="connsiteX12" fmla="*/ 3120067 w 5473615"/>
+              <a:gd name="connsiteY12" fmla="*/ 1694 h 4699056"/>
+              <a:gd name="connsiteX13" fmla="*/ 3123238 w 5473615"/>
+              <a:gd name="connsiteY13" fmla="*/ 2014 h 4699056"/>
+            </a:gdLst>
+            <a:ahLst/>
+            <a:cxnLst>
+              <a:cxn ang="0">
+                <a:pos x="connsiteX0" y="connsiteY0"/>
+              </a:cxn>
+              <a:cxn ang="0">
+                <a:pos x="connsiteX1" y="connsiteY1"/>
+              </a:cxn>
+              <a:cxn ang="0">
+                <a:pos x="connsiteX2" y="connsiteY2"/>
+              </a:cxn>
+              <a:cxn ang="0">
+                <a:pos x="connsiteX3" y="connsiteY3"/>
+              </a:cxn>
+              <a:cxn ang="0">
+                <a:pos x="connsiteX4" y="connsiteY4"/>
+              </a:cxn>
+              <a:cxn ang="0">
+                <a:pos x="connsiteX5" y="connsiteY5"/>
+              </a:cxn>
+              <a:cxn ang="0">
+                <a:pos x="connsiteX6" y="connsiteY6"/>
+              </a:cxn>
+              <a:cxn ang="0">
+                <a:pos x="connsiteX7" y="connsiteY7"/>
+              </a:cxn>
+              <a:cxn ang="0">
+                <a:pos x="connsiteX8" y="connsiteY8"/>
+              </a:cxn>
+              <a:cxn ang="0">
+                <a:pos x="connsiteX9" y="connsiteY9"/>
+              </a:cxn>
+              <a:cxn ang="0">
+                <a:pos x="connsiteX10" y="connsiteY10"/>
+              </a:cxn>
+              <a:cxn ang="0">
+                <a:pos x="connsiteX11" y="connsiteY11"/>
+              </a:cxn>
+              <a:cxn ang="0">
+                <a:pos x="connsiteX12" y="connsiteY12"/>
+              </a:cxn>
+              <a:cxn ang="0">
+                <a:pos x="connsiteX13" y="connsiteY13"/>
+              </a:cxn>
+            </a:cxnLst>
+            <a:rect l="l" t="t" r="r" b="b"/>
+            <a:pathLst>
+              <a:path w="5473615" h="4699056">
+                <a:moveTo>
+                  <a:pt x="3143213" y="0"/>
+                </a:moveTo>
+                <a:lnTo>
+                  <a:pt x="5007524" y="0"/>
+                </a:lnTo>
+                <a:cubicBezTo>
+                  <a:pt x="5264939" y="0"/>
+                  <a:pt x="5473615" y="208676"/>
+                  <a:pt x="5473615" y="466091"/>
+                </a:cubicBezTo>
+                <a:lnTo>
+                  <a:pt x="5473615" y="4232965"/>
+                </a:lnTo>
+                <a:cubicBezTo>
+                  <a:pt x="5473615" y="4490380"/>
+                  <a:pt x="5264939" y="4699056"/>
+                  <a:pt x="5007524" y="4699056"/>
+                </a:cubicBezTo>
+                <a:lnTo>
+                  <a:pt x="3143213" y="4699056"/>
+                </a:lnTo>
+                <a:cubicBezTo>
+                  <a:pt x="2885798" y="4699056"/>
+                  <a:pt x="2677122" y="4490380"/>
+                  <a:pt x="2677122" y="4232965"/>
+                </a:cubicBezTo>
+                <a:lnTo>
+                  <a:pt x="2677122" y="2215326"/>
+                </a:lnTo>
+                <a:lnTo>
+                  <a:pt x="368946" y="2215326"/>
+                </a:lnTo>
+                <a:cubicBezTo>
+                  <a:pt x="165183" y="2215326"/>
+                  <a:pt x="0" y="2050143"/>
+                  <a:pt x="0" y="1846380"/>
+                </a:cubicBezTo>
+                <a:lnTo>
+                  <a:pt x="0" y="370640"/>
+                </a:lnTo>
+                <a:cubicBezTo>
+                  <a:pt x="0" y="166877"/>
+                  <a:pt x="165183" y="1694"/>
+                  <a:pt x="368946" y="1694"/>
+                </a:cubicBezTo>
+                <a:lnTo>
+                  <a:pt x="3120067" y="1694"/>
+                </a:lnTo>
+                <a:lnTo>
+                  <a:pt x="3123238" y="2014"/>
+                </a:lnTo>
+                <a:close/>
+              </a:path>
+            </a:pathLst>
+          </a:custGeom>
+          <a:noFill/>
+          <a:ln w="38100">
+            <a:solidFill>
+              <a:srgbClr val="92D050"/>
+            </a:solidFill>
+            <a:prstDash val="sysDash"/>
+          </a:ln>
+        </p:spPr>
+        <p:style>
+          <a:lnRef idx="2">
+            <a:schemeClr val="accent1">
+              <a:shade val="15000"/>
+            </a:schemeClr>
+          </a:lnRef>
+          <a:fillRef idx="1">
+            <a:schemeClr val="accent1"/>
+          </a:fillRef>
+          <a:effectRef idx="0">
+            <a:schemeClr val="accent1"/>
+          </a:effectRef>
+          <a:fontRef idx="minor">
+            <a:schemeClr val="lt1"/>
+          </a:fontRef>
+        </p:style>
+        <p:txBody>
+          <a:bodyPr wrap="square" rtlCol="0" anchor="ctr">
+            <a:noAutofit/>
+          </a:bodyPr>
+          <a:lstStyle/>
+          <a:p>
+            <a:pPr algn="ctr"/>
+            <a:endParaRPr lang="en-US"/>
+          </a:p>
+        </p:txBody>
+      </p:sp>
+    </p:spTree>
+    <p:extLst>
+      <p:ext uri="{BB962C8B-B14F-4D97-AF65-F5344CB8AC3E}">
+        <p14:creationId xmlns:p14="http://schemas.microsoft.com/office/powerpoint/2010/main" val="3102093914"/>
+      </p:ext>
+    </p:extLst>
+  </p:cSld>
+  <p:clrMapOvr>
+    <a:masterClrMapping/>
+  </p:clrMapOvr>
+</p:sld>
+</file>
+
+<file path=ppt/slides/slide4.xml><?xml version="1.0" encoding="utf-8"?>
+<p:sld xmlns:a="http://schemas.openxmlformats.org/drawingml/2006/main" xmlns:r="http://schemas.openxmlformats.org/officeDocument/2006/relationships" xmlns:p="http://schemas.openxmlformats.org/presentationml/2006/main">
+  <p:cSld>
+    <p:spTree>
+      <p:nvGrpSpPr>
+        <p:cNvPr id="1" name=""/>
+        <p:cNvGrpSpPr/>
+        <p:nvPr/>
+      </p:nvGrpSpPr>
+      <p:grpSpPr>
+        <a:xfrm>
+          <a:off x="0" y="0"/>
+          <a:ext cx="0" cy="0"/>
+          <a:chOff x="0" y="0"/>
+          <a:chExt cx="0" cy="0"/>
+        </a:xfrm>
+      </p:grpSpPr>
       <p:grpSp>
         <p:nvGrpSpPr>
           <p:cNvPr id="8" name="Group 7">
@@ -8467,7 +9947,7 @@
 </p:sld>
 </file>
 
-<file path=ppt/slides/slide4.xml><?xml version="1.0" encoding="utf-8"?>
+<file path=ppt/slides/slide5.xml><?xml version="1.0" encoding="utf-8"?>
 <p:sld xmlns:a="http://schemas.openxmlformats.org/drawingml/2006/main" xmlns:r="http://schemas.openxmlformats.org/officeDocument/2006/relationships" xmlns:p="http://schemas.openxmlformats.org/presentationml/2006/main">
   <p:cSld>
     <p:spTree>
@@ -8629,7 +10109,7 @@
 </p:sld>
 </file>
 
-<file path=ppt/slides/slide5.xml><?xml version="1.0" encoding="utf-8"?>
+<file path=ppt/slides/slide6.xml><?xml version="1.0" encoding="utf-8"?>
 <p:sld xmlns:a="http://schemas.openxmlformats.org/drawingml/2006/main" xmlns:r="http://schemas.openxmlformats.org/officeDocument/2006/relationships" xmlns:p="http://schemas.openxmlformats.org/presentationml/2006/main">
   <p:cSld>
     <p:spTree>

</xml_diff>